<commit_message>
feat(docs): report second page
</commit_message>
<xml_diff>
--- a/report/status.pptx
+++ b/report/status.pptx
@@ -107,6 +107,11 @@
       </a:defRPr>
     </a:lvl9pPr>
   </p:defaultTextStyle>
+  <p:extLst>
+    <p:ext uri="{EFAFB233-063F-42B5-8137-9DF3F51BA10A}">
+      <p15:sldGuideLst xmlns:p15="http://schemas.microsoft.com/office/powerpoint/2012/main"/>
+    </p:ext>
+  </p:extLst>
 </p:presentation>
 </file>
 
@@ -27784,7 +27789,7 @@
               </a:lnSpc>
             </a:pPr>
             <a:r>
-              <a:rPr lang="en-US" sz="1400" b="0" u="none" strike="noStrike">
+              <a:rPr lang="en-US" sz="1400" b="0" u="none" strike="noStrike" dirty="0">
                 <a:solidFill>
                   <a:schemeClr val="dk1"/>
                 </a:solidFill>
@@ -27795,14 +27800,96 @@
               </a:rPr>
               <a:t>Short project presentation:</a:t>
             </a:r>
-            <a:endParaRPr lang="en-US" sz="1400" b="0" u="none" strike="noStrike">
-              <a:solidFill>
-                <a:srgbClr val="000000"/>
-              </a:solidFill>
-              <a:effectLst/>
-              <a:uFillTx/>
-              <a:latin typeface="Arial"/>
-            </a:endParaRPr>
+            <a:endParaRPr lang="en-US" sz="1400" b="0" u="none" strike="noStrike" dirty="0">
+              <a:solidFill>
+                <a:srgbClr val="000000"/>
+              </a:solidFill>
+              <a:effectLst/>
+              <a:uFillTx/>
+              <a:latin typeface="Arial"/>
+            </a:endParaRPr>
+          </a:p>
+          <a:p>
+            <a:pPr marL="285750" indent="-285750" defTabSz="576000">
+              <a:lnSpc>
+                <a:spcPct val="120000"/>
+              </a:lnSpc>
+              <a:buFont typeface="Arial" panose="020B0604020202020204" pitchFamily="34" charset="0"/>
+              <a:buChar char="•"/>
+            </a:pPr>
+            <a:r>
+              <a:rPr lang="en-US" sz="1400" dirty="0">
+                <a:solidFill>
+                  <a:srgbClr val="000000"/>
+                </a:solidFill>
+                <a:latin typeface="Arial"/>
+              </a:rPr>
+              <a:t>Project idea</a:t>
+            </a:r>
+          </a:p>
+          <a:p>
+            <a:pPr marL="285750" indent="-285750" defTabSz="576000">
+              <a:lnSpc>
+                <a:spcPct val="120000"/>
+              </a:lnSpc>
+              <a:buFont typeface="Arial" panose="020B0604020202020204" pitchFamily="34" charset="0"/>
+              <a:buChar char="•"/>
+            </a:pPr>
+            <a:r>
+              <a:rPr lang="en-US" sz="1400" b="0" u="none" strike="noStrike" dirty="0">
+                <a:solidFill>
+                  <a:srgbClr val="000000"/>
+                </a:solidFill>
+                <a:effectLst/>
+                <a:uFillTx/>
+                <a:latin typeface="Arial"/>
+              </a:rPr>
+              <a:t>Our workflow</a:t>
+            </a:r>
+            <a:endParaRPr lang="en-US" sz="1400" dirty="0">
+              <a:solidFill>
+                <a:srgbClr val="000000"/>
+              </a:solidFill>
+              <a:latin typeface="Arial"/>
+            </a:endParaRPr>
+          </a:p>
+          <a:p>
+            <a:pPr marL="285750" indent="-285750" defTabSz="576000">
+              <a:lnSpc>
+                <a:spcPct val="120000"/>
+              </a:lnSpc>
+              <a:buFont typeface="Arial" panose="020B0604020202020204" pitchFamily="34" charset="0"/>
+              <a:buChar char="•"/>
+            </a:pPr>
+            <a:r>
+              <a:rPr lang="en-US" sz="1400" dirty="0">
+                <a:solidFill>
+                  <a:srgbClr val="000000"/>
+                </a:solidFill>
+                <a:latin typeface="Arial"/>
+              </a:rPr>
+              <a:t>Problems we faced as well as feature requests</a:t>
+            </a:r>
+          </a:p>
+          <a:p>
+            <a:pPr marL="285750" indent="-285750" defTabSz="576000">
+              <a:lnSpc>
+                <a:spcPct val="120000"/>
+              </a:lnSpc>
+              <a:buFont typeface="Arial" panose="020B0604020202020204" pitchFamily="34" charset="0"/>
+              <a:buChar char="•"/>
+            </a:pPr>
+            <a:r>
+              <a:rPr lang="en-US" sz="1400" b="0" u="none" strike="noStrike" dirty="0">
+                <a:solidFill>
+                  <a:srgbClr val="000000"/>
+                </a:solidFill>
+                <a:effectLst/>
+                <a:uFillTx/>
+                <a:latin typeface="Arial"/>
+              </a:rPr>
+              <a:t>Demonstration of our project</a:t>
+            </a:r>
           </a:p>
           <a:p>
             <a:pPr defTabSz="576000">
@@ -27810,7 +27897,7 @@
                 <a:spcPct val="120000"/>
               </a:lnSpc>
             </a:pPr>
-            <a:endParaRPr lang="en-US" sz="1400" b="0" u="none" strike="noStrike">
+            <a:endParaRPr lang="en-US" sz="1400" b="0" u="none" strike="noStrike" dirty="0">
               <a:solidFill>
                 <a:srgbClr val="000000"/>
               </a:solidFill>
@@ -27825,7 +27912,7 @@
                 <a:spcPct val="120000"/>
               </a:lnSpc>
             </a:pPr>
-            <a:endParaRPr lang="en-US" sz="1400" b="0" u="none" strike="noStrike">
+            <a:endParaRPr lang="en-US" sz="1400" b="0" u="none" strike="noStrike" dirty="0">
               <a:solidFill>
                 <a:srgbClr val="000000"/>
               </a:solidFill>
@@ -27840,71 +27927,84 @@
                 <a:spcPct val="120000"/>
               </a:lnSpc>
             </a:pPr>
-            <a:endParaRPr lang="en-US" sz="1400" b="0" u="none" strike="noStrike">
-              <a:solidFill>
-                <a:srgbClr val="000000"/>
-              </a:solidFill>
-              <a:effectLst/>
-              <a:uFillTx/>
-              <a:latin typeface="Arial"/>
-            </a:endParaRPr>
-          </a:p>
-          <a:p>
-            <a:pPr defTabSz="576000">
+            <a:r>
+              <a:rPr lang="en-US" sz="1400" b="0" u="none" strike="noStrike" dirty="0">
+                <a:solidFill>
+                  <a:schemeClr val="dk1"/>
+                </a:solidFill>
+                <a:effectLst/>
+                <a:uFillTx/>
+                <a:latin typeface="Arial"/>
+                <a:ea typeface="Arial Unicode MS"/>
+              </a:rPr>
+              <a:t>Any special equipment need for demo at the demo Day ?</a:t>
+            </a:r>
+          </a:p>
+          <a:p>
+            <a:pPr marL="285750" indent="-285750" defTabSz="576000">
               <a:lnSpc>
                 <a:spcPct val="120000"/>
               </a:lnSpc>
-            </a:pPr>
-            <a:endParaRPr lang="en-US" sz="1400" b="0" u="none" strike="noStrike">
-              <a:solidFill>
-                <a:srgbClr val="000000"/>
-              </a:solidFill>
-              <a:effectLst/>
-              <a:uFillTx/>
-              <a:latin typeface="Arial"/>
-            </a:endParaRPr>
-          </a:p>
-          <a:p>
-            <a:pPr defTabSz="576000">
+              <a:buFont typeface="Arial" panose="020B0604020202020204" pitchFamily="34" charset="0"/>
+              <a:buChar char="•"/>
+            </a:pPr>
+            <a:r>
+              <a:rPr lang="en-US" sz="1400" dirty="0">
+                <a:solidFill>
+                  <a:schemeClr val="dk1"/>
+                </a:solidFill>
+                <a:latin typeface="Arial"/>
+                <a:sym typeface="Wingdings" panose="05000000000000000000" pitchFamily="2" charset="2"/>
+              </a:rPr>
+              <a:t>A hairdryer</a:t>
+            </a:r>
+          </a:p>
+          <a:p>
+            <a:pPr marL="285750" indent="-285750" defTabSz="576000">
               <a:lnSpc>
                 <a:spcPct val="120000"/>
               </a:lnSpc>
-            </a:pPr>
-            <a:endParaRPr lang="en-US" sz="1400" b="0" u="none" strike="noStrike">
-              <a:solidFill>
-                <a:srgbClr val="000000"/>
-              </a:solidFill>
-              <a:effectLst/>
-              <a:uFillTx/>
-              <a:latin typeface="Arial"/>
-            </a:endParaRPr>
-          </a:p>
-          <a:p>
-            <a:pPr defTabSz="576000">
+              <a:buFont typeface="Arial" panose="020B0604020202020204" pitchFamily="34" charset="0"/>
+              <a:buChar char="•"/>
+            </a:pPr>
+            <a:r>
+              <a:rPr lang="en-US" sz="1400" b="0" u="none" strike="noStrike" dirty="0">
+                <a:solidFill>
+                  <a:schemeClr val="dk1"/>
+                </a:solidFill>
+                <a:effectLst/>
+                <a:uFillTx/>
+                <a:latin typeface="Arial"/>
+                <a:sym typeface="Wingdings" panose="05000000000000000000" pitchFamily="2" charset="2"/>
+              </a:rPr>
+              <a:t>An electric Toothbrush</a:t>
+            </a:r>
+          </a:p>
+          <a:p>
+            <a:pPr marL="285750" indent="-285750" defTabSz="576000">
               <a:lnSpc>
                 <a:spcPct val="120000"/>
               </a:lnSpc>
-            </a:pPr>
-            <a:r>
-              <a:rPr lang="en-US" sz="1400" b="0" u="none" strike="noStrike">
+              <a:buFont typeface="Arial" panose="020B0604020202020204" pitchFamily="34" charset="0"/>
+              <a:buChar char="•"/>
+            </a:pPr>
+            <a:r>
+              <a:rPr lang="en-US" sz="1400">
                 <a:solidFill>
                   <a:schemeClr val="dk1"/>
                 </a:solidFill>
-                <a:effectLst/>
-                <a:uFillTx/>
-                <a:latin typeface="Arial"/>
-                <a:ea typeface="Arial Unicode MS"/>
-              </a:rPr>
-              <a:t>Any special equipment need for demo at the demo Day ?</a:t>
-            </a:r>
-            <a:endParaRPr lang="en-US" sz="1400" b="0" u="none" strike="noStrike">
-              <a:solidFill>
-                <a:srgbClr val="000000"/>
-              </a:solidFill>
-              <a:effectLst/>
-              <a:uFillTx/>
-              <a:latin typeface="Arial"/>
-            </a:endParaRPr>
+              </a:rPr>
+              <a:t>A shower </a:t>
+            </a:r>
+            <a:r>
+              <a:rPr lang="en-US" sz="1400">
+                <a:solidFill>
+                  <a:schemeClr val="dk1"/>
+                </a:solidFill>
+                <a:sym typeface="Wingdings" panose="05000000000000000000" pitchFamily="2" charset="2"/>
+              </a:rPr>
+              <a:t></a:t>
+            </a:r>
           </a:p>
         </p:txBody>
       </p:sp>

</xml_diff>